<commit_message>
added an issue for personnel mgt
</commit_message>
<xml_diff>
--- a/ietf100/IASA-PlusPlus-Challenges.pptx
+++ b/ietf100/IASA-PlusPlus-Challenges.pptx
@@ -3130,7 +3130,7 @@
           <p:nvPr>
             <p:extLst>
               <p:ext uri="{D42A27DB-BD31-4B8C-83A1-F6EECF244321}">
-                <p14:modId xmlns:p14="http://schemas.microsoft.com/office/powerpoint/2010/main" val="2668459476"/>
+                <p14:modId xmlns:p14="http://schemas.microsoft.com/office/powerpoint/2010/main" val="2902317193"/>
               </p:ext>
             </p:extLst>
           </p:nvPr>
@@ -3264,7 +3264,7 @@
                     <a:p>
                       <a:r>
                         <a:rPr lang="en-US" sz="1600" dirty="0" smtClean="0"/>
-                        <a:t>Personnel management</a:t>
+                        <a:t>Personnel management and review</a:t>
                       </a:r>
                       <a:endParaRPr lang="en-US" sz="1600" dirty="0"/>
                     </a:p>
@@ -3276,9 +3276,34 @@
                     <a:bodyPr/>
                     <a:lstStyle/>
                     <a:p>
+                      <a:pPr marL="0" marR="0" indent="0" algn="l" defTabSz="457200" rtl="0" eaLnBrk="1" fontAlgn="auto" latinLnBrk="0" hangingPunct="1">
+                        <a:lnSpc>
+                          <a:spcPct val="100000"/>
+                        </a:lnSpc>
+                        <a:spcBef>
+                          <a:spcPts val="0"/>
+                        </a:spcBef>
+                        <a:spcAft>
+                          <a:spcPts val="0"/>
+                        </a:spcAft>
+                        <a:buClrTx/>
+                        <a:buSzTx/>
+                        <a:buFontTx/>
+                        <a:buNone/>
+                        <a:tabLst/>
+                        <a:defRPr/>
+                      </a:pPr>
                       <a:r>
                         <a:rPr lang="en-US" sz="1600" dirty="0" smtClean="0"/>
-                        <a:t>IAOC</a:t>
+                        <a:t>The IAD</a:t>
+                      </a:r>
+                      <a:r>
+                        <a:rPr lang="en-US" sz="1600" baseline="0" dirty="0" smtClean="0"/>
+                        <a:t> works with and for the IETF.</a:t>
+                      </a:r>
+                      <a:r>
+                        <a:rPr lang="en-US" sz="1600" dirty="0" smtClean="0"/>
+                        <a:t> IAOC</a:t>
                       </a:r>
                       <a:r>
                         <a:rPr lang="en-US" sz="1600" baseline="0" dirty="0" smtClean="0"/>
@@ -3286,17 +3311,20 @@
                       </a:r>
                     </a:p>
                     <a:p>
+                      <a:endParaRPr lang="en-US" sz="1600" baseline="0" dirty="0" smtClean="0"/>
+                    </a:p>
+                    <a:p>
                       <a:r>
                         <a:rPr lang="en-US" sz="1600" baseline="0" dirty="0" smtClean="0"/>
-                        <a:t>Needs to know compensation numbers to set </a:t>
+                        <a:t>IAOC does the annual performance review </a:t>
+                      </a:r>
+                      <a:r>
+                        <a:rPr lang="mr-IN" sz="1600" baseline="0" dirty="0" smtClean="0"/>
+                        <a:t>–</a:t>
                       </a:r>
                       <a:r>
                         <a:rPr lang="en-US" sz="1600" baseline="0" dirty="0" smtClean="0"/>
-                        <a:t>successor IAD </a:t>
-                      </a:r>
-                      <a:r>
-                        <a:rPr lang="en-US" sz="1600" baseline="0" dirty="0" smtClean="0"/>
-                        <a:t>compensation correctly</a:t>
+                        <a:t> but subject to HR framework that fits a 100 person org (ISOC)</a:t>
                       </a:r>
                       <a:endParaRPr lang="en-US" sz="1600" dirty="0"/>
                     </a:p>
@@ -3310,11 +3338,11 @@
                     <a:p>
                       <a:r>
                         <a:rPr lang="en-US" sz="1600" dirty="0" smtClean="0"/>
-                        <a:t>Exposing personnel</a:t>
+                        <a:t>ISOC can’t do the performance review of the IAD as</a:t>
                       </a:r>
                       <a:r>
                         <a:rPr lang="en-US" sz="1600" baseline="0" dirty="0" smtClean="0"/>
-                        <a:t> compensation to non-employees is not advised</a:t>
+                        <a:t> the IAD doesn’t actually fit into the ISOC structure and flow.</a:t>
                       </a:r>
                       <a:endParaRPr lang="en-US" sz="1600" dirty="0"/>
                     </a:p>
@@ -3330,7 +3358,11 @@
                     <a:p>
                       <a:r>
                         <a:rPr lang="en-US" sz="1600" dirty="0" smtClean="0"/>
-                        <a:t>Contracts</a:t>
+                        <a:t>Personnel </a:t>
+                      </a:r>
+                      <a:r>
+                        <a:rPr lang="en-US" sz="1600" dirty="0" smtClean="0"/>
+                        <a:t>details</a:t>
                       </a:r>
                       <a:endParaRPr lang="en-US" sz="1600" dirty="0"/>
                     </a:p>
@@ -3343,12 +3375,12 @@
                     <a:lstStyle/>
                     <a:p>
                       <a:r>
-                        <a:rPr lang="en-US" sz="1600" dirty="0" smtClean="0"/>
-                        <a:t>IETF negotiates</a:t>
-                      </a:r>
-                      <a:r>
                         <a:rPr lang="en-US" sz="1600" baseline="0" dirty="0" smtClean="0"/>
-                        <a:t> terms aligned with its needs, expectations, and relationships</a:t>
+                        <a:t>Needs </a:t>
+                      </a:r>
+                      <a:r>
+                        <a:rPr lang="en-US" sz="1600" baseline="0" dirty="0" smtClean="0"/>
+                        <a:t>to know compensation numbers to set successor IAD compensation correctly</a:t>
                       </a:r>
                       <a:endParaRPr lang="en-US" sz="1600" dirty="0"/>
                     </a:p>
@@ -3362,39 +3394,13 @@
                     <a:p>
                       <a:r>
                         <a:rPr lang="en-US" sz="1600" dirty="0" smtClean="0"/>
-                        <a:t>I</a:t>
+                        <a:t>Exposing personnel</a:t>
                       </a:r>
                       <a:r>
                         <a:rPr lang="en-US" sz="1600" baseline="0" dirty="0" smtClean="0"/>
-                        <a:t>s the signer of contracts for the IETF (e.g., hotels, </a:t>
-                      </a:r>
-                      <a:r>
-                        <a:rPr lang="en-US" sz="1600" baseline="0" dirty="0" err="1" smtClean="0"/>
-                        <a:t>etc</a:t>
-                      </a:r>
-                      <a:r>
-                        <a:rPr lang="en-US" sz="1600" baseline="0" dirty="0" smtClean="0"/>
-                        <a:t>).</a:t>
-                      </a:r>
-                      <a:r>
-                        <a:rPr lang="en-US" sz="1600" dirty="0" smtClean="0"/>
-                        <a:t>   </a:t>
-                      </a:r>
-                    </a:p>
-                    <a:p>
-                      <a:r>
-                        <a:rPr lang="en-US" sz="1600" dirty="0" smtClean="0"/>
-                        <a:t>ISOC</a:t>
-                      </a:r>
-                      <a:r>
-                        <a:rPr lang="en-US" sz="1600" baseline="0" dirty="0" smtClean="0"/>
-                        <a:t> must be comfortable with terms in the contract for exposure and fiduciary responsibilities.  (</a:t>
-                      </a:r>
-                      <a:r>
-                        <a:rPr lang="en-US" sz="1600" i="1" baseline="0" dirty="0" smtClean="0"/>
-                        <a:t>Finding the line can be hard)</a:t>
-                      </a:r>
-                      <a:endParaRPr lang="en-US" sz="1600" dirty="0" smtClean="0"/>
+                        <a:t> compensation to non-employees is not advised</a:t>
+                      </a:r>
+                      <a:endParaRPr lang="en-US" sz="1600" dirty="0"/>
                     </a:p>
                   </a:txBody>
                   <a:tcPr/>
@@ -3453,11 +3459,7 @@
           <a:p>
             <a:r>
               <a:rPr lang="en-US" dirty="0" smtClean="0"/>
-              <a:t>Inter-organizational challenges for IASA+</a:t>
-            </a:r>
-            <a:r>
-              <a:rPr lang="en-US" dirty="0" smtClean="0"/>
-              <a:t>+ (continued)</a:t>
+              <a:t>Inter-organizational challenges for IASA++ (continued)</a:t>
             </a:r>
             <a:endParaRPr lang="en-US" dirty="0"/>
           </a:p>
@@ -3472,14 +3474,14 @@
           <p:nvPr>
             <p:extLst>
               <p:ext uri="{D42A27DB-BD31-4B8C-83A1-F6EECF244321}">
-                <p14:modId xmlns:p14="http://schemas.microsoft.com/office/powerpoint/2010/main" val="1466438865"/>
+                <p14:modId xmlns:p14="http://schemas.microsoft.com/office/powerpoint/2010/main" val="1769368792"/>
               </p:ext>
             </p:extLst>
           </p:nvPr>
         </p:nvGraphicFramePr>
         <p:xfrm>
           <a:off x="339826" y="1796143"/>
-          <a:ext cx="8674504" cy="2839720"/>
+          <a:ext cx="8674504" cy="4394200"/>
         </p:xfrm>
         <a:graphic>
           <a:graphicData uri="http://schemas.openxmlformats.org/drawingml/2006/table">
@@ -3527,6 +3529,84 @@
                         <a:t>ISOC perspective</a:t>
                       </a:r>
                       <a:endParaRPr lang="en-US" dirty="0"/>
+                    </a:p>
+                  </a:txBody>
+                  <a:tcPr/>
+                </a:tc>
+              </a:tr>
+              <a:tr h="370840">
+                <a:tc>
+                  <a:txBody>
+                    <a:bodyPr/>
+                    <a:lstStyle/>
+                    <a:p>
+                      <a:r>
+                        <a:rPr lang="en-US" sz="1600" dirty="0" smtClean="0"/>
+                        <a:t>Contracts</a:t>
+                      </a:r>
+                      <a:endParaRPr lang="en-US" sz="1600" dirty="0"/>
+                    </a:p>
+                  </a:txBody>
+                  <a:tcPr/>
+                </a:tc>
+                <a:tc>
+                  <a:txBody>
+                    <a:bodyPr/>
+                    <a:lstStyle/>
+                    <a:p>
+                      <a:r>
+                        <a:rPr lang="en-US" sz="1600" dirty="0" smtClean="0"/>
+                        <a:t>IETF negotiates</a:t>
+                      </a:r>
+                      <a:r>
+                        <a:rPr lang="en-US" sz="1600" baseline="0" dirty="0" smtClean="0"/>
+                        <a:t> terms aligned with its needs, expectations, and relationships</a:t>
+                      </a:r>
+                      <a:endParaRPr lang="en-US" sz="1600" dirty="0"/>
+                    </a:p>
+                  </a:txBody>
+                  <a:tcPr/>
+                </a:tc>
+                <a:tc>
+                  <a:txBody>
+                    <a:bodyPr/>
+                    <a:lstStyle/>
+                    <a:p>
+                      <a:r>
+                        <a:rPr lang="en-US" sz="1600" dirty="0" smtClean="0"/>
+                        <a:t>I</a:t>
+                      </a:r>
+                      <a:r>
+                        <a:rPr lang="en-US" sz="1600" baseline="0" dirty="0" smtClean="0"/>
+                        <a:t>s the signer of contracts for the IETF (e.g., hotels, </a:t>
+                      </a:r>
+                      <a:r>
+                        <a:rPr lang="en-US" sz="1600" baseline="0" dirty="0" err="1" smtClean="0"/>
+                        <a:t>etc</a:t>
+                      </a:r>
+                      <a:r>
+                        <a:rPr lang="en-US" sz="1600" baseline="0" dirty="0" smtClean="0"/>
+                        <a:t>).</a:t>
+                      </a:r>
+                      <a:r>
+                        <a:rPr lang="en-US" sz="1600" dirty="0" smtClean="0"/>
+                        <a:t>   </a:t>
+                      </a:r>
+                    </a:p>
+                    <a:p>
+                      <a:r>
+                        <a:rPr lang="en-US" sz="1600" dirty="0" smtClean="0"/>
+                        <a:t>ISOC</a:t>
+                      </a:r>
+                      <a:r>
+                        <a:rPr lang="en-US" sz="1600" baseline="0" dirty="0" smtClean="0"/>
+                        <a:t> must be comfortable with terms in the contract for exposure and fiduciary responsibilities.  (</a:t>
+                      </a:r>
+                      <a:r>
+                        <a:rPr lang="en-US" sz="1600" i="1" baseline="0" dirty="0" smtClean="0"/>
+                        <a:t>Finding the line can be hard)</a:t>
+                      </a:r>
+                      <a:endParaRPr lang="en-US" sz="1600" dirty="0" smtClean="0"/>
                     </a:p>
                   </a:txBody>
                   <a:tcPr/>

</xml_diff>

<commit_message>
clarifications from external input
</commit_message>
<xml_diff>
--- a/ietf100/IASA-PlusPlus-Challenges.pptx
+++ b/ietf100/IASA-PlusPlus-Challenges.pptx
@@ -289,7 +289,7 @@
           <a:p>
             <a:fld id="{D1216D08-2DA9-FD41-B9D8-2A7C6236187D}" type="datetimeFigureOut">
               <a:rPr lang="en-US" smtClean="0"/>
-              <a:t>11/12/17</a:t>
+              <a:t>11/13/17</a:t>
             </a:fld>
             <a:endParaRPr lang="en-US"/>
           </a:p>
@@ -459,7 +459,7 @@
           <a:p>
             <a:fld id="{D1216D08-2DA9-FD41-B9D8-2A7C6236187D}" type="datetimeFigureOut">
               <a:rPr lang="en-US" smtClean="0"/>
-              <a:t>11/12/17</a:t>
+              <a:t>11/13/17</a:t>
             </a:fld>
             <a:endParaRPr lang="en-US"/>
           </a:p>
@@ -639,7 +639,7 @@
           <a:p>
             <a:fld id="{D1216D08-2DA9-FD41-B9D8-2A7C6236187D}" type="datetimeFigureOut">
               <a:rPr lang="en-US" smtClean="0"/>
-              <a:t>11/12/17</a:t>
+              <a:t>11/13/17</a:t>
             </a:fld>
             <a:endParaRPr lang="en-US"/>
           </a:p>
@@ -809,7 +809,7 @@
           <a:p>
             <a:fld id="{D1216D08-2DA9-FD41-B9D8-2A7C6236187D}" type="datetimeFigureOut">
               <a:rPr lang="en-US" smtClean="0"/>
-              <a:t>11/12/17</a:t>
+              <a:t>11/13/17</a:t>
             </a:fld>
             <a:endParaRPr lang="en-US"/>
           </a:p>
@@ -1055,7 +1055,7 @@
           <a:p>
             <a:fld id="{D1216D08-2DA9-FD41-B9D8-2A7C6236187D}" type="datetimeFigureOut">
               <a:rPr lang="en-US" smtClean="0"/>
-              <a:t>11/12/17</a:t>
+              <a:t>11/13/17</a:t>
             </a:fld>
             <a:endParaRPr lang="en-US"/>
           </a:p>
@@ -1343,7 +1343,7 @@
           <a:p>
             <a:fld id="{D1216D08-2DA9-FD41-B9D8-2A7C6236187D}" type="datetimeFigureOut">
               <a:rPr lang="en-US" smtClean="0"/>
-              <a:t>11/12/17</a:t>
+              <a:t>11/13/17</a:t>
             </a:fld>
             <a:endParaRPr lang="en-US"/>
           </a:p>
@@ -1765,7 +1765,7 @@
           <a:p>
             <a:fld id="{D1216D08-2DA9-FD41-B9D8-2A7C6236187D}" type="datetimeFigureOut">
               <a:rPr lang="en-US" smtClean="0"/>
-              <a:t>11/12/17</a:t>
+              <a:t>11/13/17</a:t>
             </a:fld>
             <a:endParaRPr lang="en-US"/>
           </a:p>
@@ -1883,7 +1883,7 @@
           <a:p>
             <a:fld id="{D1216D08-2DA9-FD41-B9D8-2A7C6236187D}" type="datetimeFigureOut">
               <a:rPr lang="en-US" smtClean="0"/>
-              <a:t>11/12/17</a:t>
+              <a:t>11/13/17</a:t>
             </a:fld>
             <a:endParaRPr lang="en-US"/>
           </a:p>
@@ -1978,7 +1978,7 @@
           <a:p>
             <a:fld id="{D1216D08-2DA9-FD41-B9D8-2A7C6236187D}" type="datetimeFigureOut">
               <a:rPr lang="en-US" smtClean="0"/>
-              <a:t>11/12/17</a:t>
+              <a:t>11/13/17</a:t>
             </a:fld>
             <a:endParaRPr lang="en-US"/>
           </a:p>
@@ -2255,7 +2255,7 @@
           <a:p>
             <a:fld id="{D1216D08-2DA9-FD41-B9D8-2A7C6236187D}" type="datetimeFigureOut">
               <a:rPr lang="en-US" smtClean="0"/>
-              <a:t>11/12/17</a:t>
+              <a:t>11/13/17</a:t>
             </a:fld>
             <a:endParaRPr lang="en-US"/>
           </a:p>
@@ -2508,7 +2508,7 @@
           <a:p>
             <a:fld id="{D1216D08-2DA9-FD41-B9D8-2A7C6236187D}" type="datetimeFigureOut">
               <a:rPr lang="en-US" smtClean="0"/>
-              <a:t>11/12/17</a:t>
+              <a:t>11/13/17</a:t>
             </a:fld>
             <a:endParaRPr lang="en-US"/>
           </a:p>
@@ -2721,7 +2721,7 @@
           <a:p>
             <a:fld id="{D1216D08-2DA9-FD41-B9D8-2A7C6236187D}" type="datetimeFigureOut">
               <a:rPr lang="en-US" smtClean="0"/>
-              <a:t>11/12/17</a:t>
+              <a:t>11/13/17</a:t>
             </a:fld>
             <a:endParaRPr lang="en-US"/>
           </a:p>
@@ -3358,11 +3358,7 @@
                     <a:p>
                       <a:r>
                         <a:rPr lang="en-US" sz="1600" dirty="0" smtClean="0"/>
-                        <a:t>Personnel </a:t>
-                      </a:r>
-                      <a:r>
-                        <a:rPr lang="en-US" sz="1600" dirty="0" smtClean="0"/>
-                        <a:t>details</a:t>
+                        <a:t>Personnel details</a:t>
                       </a:r>
                       <a:endParaRPr lang="en-US" sz="1600" dirty="0"/>
                     </a:p>
@@ -3376,11 +3372,7 @@
                     <a:p>
                       <a:r>
                         <a:rPr lang="en-US" sz="1600" baseline="0" dirty="0" smtClean="0"/>
-                        <a:t>Needs </a:t>
-                      </a:r>
-                      <a:r>
-                        <a:rPr lang="en-US" sz="1600" baseline="0" dirty="0" smtClean="0"/>
-                        <a:t>to know compensation numbers to set successor IAD compensation correctly</a:t>
+                        <a:t>Needs to know compensation numbers to set successor IAD compensation correctly</a:t>
                       </a:r>
                       <a:endParaRPr lang="en-US" sz="1600" dirty="0"/>
                     </a:p>
@@ -3420,6 +3412,13 @@
   <p:clrMapOvr>
     <a:masterClrMapping/>
   </p:clrMapOvr>
+  <p:timing>
+    <p:tnLst>
+      <p:par>
+        <p:cTn xmlns:p14="http://schemas.microsoft.com/office/powerpoint/2010/main" id="1" dur="indefinite" restart="never" nodeType="tmRoot"/>
+      </p:par>
+    </p:tnLst>
+  </p:timing>
 </p:sld>
 </file>
 
@@ -3474,7 +3473,7 @@
           <p:nvPr>
             <p:extLst>
               <p:ext uri="{D42A27DB-BD31-4B8C-83A1-F6EECF244321}">
-                <p14:modId xmlns:p14="http://schemas.microsoft.com/office/powerpoint/2010/main" val="1769368792"/>
+                <p14:modId xmlns:p14="http://schemas.microsoft.com/office/powerpoint/2010/main" val="1330755333"/>
               </p:ext>
             </p:extLst>
           </p:nvPr>
@@ -3620,7 +3619,7 @@
                     <a:p>
                       <a:r>
                         <a:rPr lang="en-US" sz="1600" dirty="0" smtClean="0"/>
-                        <a:t>Software resources</a:t>
+                        <a:t>Business support software resources</a:t>
                       </a:r>
                       <a:endParaRPr lang="en-US" sz="1600" dirty="0"/>
                     </a:p>
@@ -3676,7 +3675,11 @@
                     <a:p>
                       <a:r>
                         <a:rPr lang="en-US" sz="1600" dirty="0" smtClean="0"/>
-                        <a:t>Representation</a:t>
+                        <a:t>Operational</a:t>
+                      </a:r>
+                      <a:r>
+                        <a:rPr lang="en-US" sz="1600" baseline="0" dirty="0" smtClean="0"/>
+                        <a:t> support ideology</a:t>
                       </a:r>
                       <a:endParaRPr lang="en-US" sz="1600" dirty="0"/>
                     </a:p>
@@ -3690,11 +3693,11 @@
                     <a:p>
                       <a:r>
                         <a:rPr lang="en-US" sz="1600" dirty="0" smtClean="0"/>
-                        <a:t>The IETF makes its</a:t>
+                        <a:t>The IETF has ideology</a:t>
                       </a:r>
                       <a:r>
                         <a:rPr lang="en-US" sz="1600" baseline="0" dirty="0" smtClean="0"/>
-                        <a:t> own choices, and needs to represent to attract financial support</a:t>
+                        <a:t> about best practices, open source, eating our own dog food</a:t>
                       </a:r>
                       <a:endParaRPr lang="en-US" sz="1600" dirty="0"/>
                     </a:p>
@@ -3708,19 +3711,11 @@
                     <a:p>
                       <a:r>
                         <a:rPr lang="en-US" sz="1600" dirty="0" smtClean="0"/>
-                        <a:t>Why</a:t>
+                        <a:t>“Why are my IT choices driven by the</a:t>
                       </a:r>
                       <a:r>
                         <a:rPr lang="en-US" sz="1600" baseline="0" dirty="0" smtClean="0"/>
-                        <a:t> is ISOC calling me about the IETF?  </a:t>
-                      </a:r>
-                      <a:r>
-                        <a:rPr lang="en-US" sz="1600" dirty="0" smtClean="0"/>
-                        <a:t>When is the IETF “us”, and when is</a:t>
-                      </a:r>
-                      <a:r>
-                        <a:rPr lang="en-US" sz="1600" baseline="0" dirty="0" smtClean="0"/>
-                        <a:t> it separate?  Very difficult to make that clear to prospective supporters</a:t>
+                        <a:t> IETF’s ideology”</a:t>
                       </a:r>
                       <a:endParaRPr lang="en-US" sz="1600" dirty="0"/>
                     </a:p>
@@ -3736,15 +3731,15 @@
                     <a:p>
                       <a:r>
                         <a:rPr lang="en-US" sz="1600" dirty="0" smtClean="0"/>
-                        <a:t>Ideology</a:t>
+                        <a:t>Administrative</a:t>
                       </a:r>
                       <a:r>
                         <a:rPr lang="en-US" sz="1600" baseline="0" dirty="0" smtClean="0"/>
-                        <a:t> (</a:t>
-                      </a:r>
-                      <a:r>
-                        <a:rPr lang="en-US" sz="1600" baseline="0" smtClean="0"/>
-                        <a:t>flipped perspective)</a:t>
+                        <a:t> </a:t>
+                      </a:r>
+                      <a:r>
+                        <a:rPr lang="en-US" sz="1600" dirty="0" smtClean="0"/>
+                        <a:t>Representation</a:t>
                       </a:r>
                       <a:endParaRPr lang="en-US" sz="1600" dirty="0"/>
                     </a:p>
@@ -3758,11 +3753,11 @@
                     <a:p>
                       <a:r>
                         <a:rPr lang="en-US" sz="1600" dirty="0" smtClean="0"/>
-                        <a:t>The IETF has ideology</a:t>
+                        <a:t>The IETF makes its</a:t>
                       </a:r>
                       <a:r>
                         <a:rPr lang="en-US" sz="1600" baseline="0" dirty="0" smtClean="0"/>
-                        <a:t> about best practices, open source, eating our own dog food</a:t>
+                        <a:t> own choices, and needs to represent to attract financial support</a:t>
                       </a:r>
                       <a:endParaRPr lang="en-US" sz="1600" dirty="0"/>
                     </a:p>
@@ -3776,11 +3771,19 @@
                     <a:p>
                       <a:r>
                         <a:rPr lang="en-US" sz="1600" dirty="0" smtClean="0"/>
-                        <a:t>“Why are my IT choices driven by the</a:t>
+                        <a:t>Why</a:t>
                       </a:r>
                       <a:r>
                         <a:rPr lang="en-US" sz="1600" baseline="0" dirty="0" smtClean="0"/>
-                        <a:t> IETF’s ideology”</a:t>
+                        <a:t> is ISOC calling me about the IETF?  </a:t>
+                      </a:r>
+                      <a:r>
+                        <a:rPr lang="en-US" sz="1600" dirty="0" smtClean="0"/>
+                        <a:t>When is the IETF “us”, and when is</a:t>
+                      </a:r>
+                      <a:r>
+                        <a:rPr lang="en-US" sz="1600" baseline="0" dirty="0" smtClean="0"/>
+                        <a:t> it separate?  Very difficult to make that clear to prospective supporters</a:t>
                       </a:r>
                       <a:endParaRPr lang="en-US" sz="1600" dirty="0"/>
                     </a:p>
@@ -3802,6 +3805,13 @@
   <p:clrMapOvr>
     <a:masterClrMapping/>
   </p:clrMapOvr>
+  <p:timing>
+    <p:tnLst>
+      <p:par>
+        <p:cTn xmlns:p14="http://schemas.microsoft.com/office/powerpoint/2010/main" id="1" dur="indefinite" restart="never" nodeType="tmRoot"/>
+      </p:par>
+    </p:tnLst>
+  </p:timing>
 </p:sld>
 </file>
 

</xml_diff>